<commit_message>
new: Minor presentation tweaks, convert to PDF
</commit_message>
<xml_diff>
--- a/presentation/grammar_presentation.pptx
+++ b/presentation/grammar_presentation.pptx
@@ -137,7 +137,7 @@
           <p:cNvPr id="2" name="Title 1">
             <a:extLst>
               <a:ext uri="{FF2B5EF4-FFF2-40B4-BE49-F238E27FC236}">
-                <a16:creationId xmlns:a16="http://schemas.microsoft.com/office/drawing/2014/main" id="{02DF2190-C287-3AF4-537F-71D03C5635D2}"/>
+                <a16:creationId xmlns:a16="http://schemas.microsoft.com/office/drawing/2014/main" id="{609BB69C-AC99-2C90-B863-8925865F3C74}"/>
               </a:ext>
             </a:extLst>
           </p:cNvPr>
@@ -166,7 +166,7 @@
           <p:cNvPr id="3" name="Date Placeholder 2">
             <a:extLst>
               <a:ext uri="{FF2B5EF4-FFF2-40B4-BE49-F238E27FC236}">
-                <a16:creationId xmlns:a16="http://schemas.microsoft.com/office/drawing/2014/main" id="{0D43F937-6A3A-BDA2-5145-C7A7180751BA}"/>
+                <a16:creationId xmlns:a16="http://schemas.microsoft.com/office/drawing/2014/main" id="{8F192048-8072-F8CB-CE03-437167CFCD9A}"/>
               </a:ext>
             </a:extLst>
           </p:cNvPr>
@@ -182,9 +182,9 @@
           <a:bodyPr/>
           <a:lstStyle/>
           <a:p>
-            <a:fld id="{538F4ACB-81F4-4DFC-A610-803AC2463E56}" type="datetimeFigureOut">
+            <a:fld id="{0EB57F9A-D7FD-49DB-9770-949BA47D30B1}" type="datetimeFigureOut">
               <a:rPr lang="cs-CZ" smtClean="0"/>
-              <a:t>30.10.2022</a:t>
+              <a:t>31.10.2022</a:t>
             </a:fld>
             <a:endParaRPr lang="cs-CZ"/>
           </a:p>
@@ -195,7 +195,7 @@
           <p:cNvPr id="4" name="Footer Placeholder 3">
             <a:extLst>
               <a:ext uri="{FF2B5EF4-FFF2-40B4-BE49-F238E27FC236}">
-                <a16:creationId xmlns:a16="http://schemas.microsoft.com/office/drawing/2014/main" id="{C4723259-D22D-406B-A7B2-656AF3C7073B}"/>
+                <a16:creationId xmlns:a16="http://schemas.microsoft.com/office/drawing/2014/main" id="{E0E3F0E8-EC55-B544-04BD-38E369D93BFE}"/>
               </a:ext>
             </a:extLst>
           </p:cNvPr>
@@ -220,7 +220,7 @@
           <p:cNvPr id="5" name="Slide Number Placeholder 4">
             <a:extLst>
               <a:ext uri="{FF2B5EF4-FFF2-40B4-BE49-F238E27FC236}">
-                <a16:creationId xmlns:a16="http://schemas.microsoft.com/office/drawing/2014/main" id="{178EA998-E519-1D16-3E33-31FB4FBC3FD2}"/>
+                <a16:creationId xmlns:a16="http://schemas.microsoft.com/office/drawing/2014/main" id="{5FEA4077-7174-C49B-2A2F-0D811313D561}"/>
               </a:ext>
             </a:extLst>
           </p:cNvPr>
@@ -236,7 +236,7 @@
           <a:bodyPr/>
           <a:lstStyle/>
           <a:p>
-            <a:fld id="{C53A4434-507F-402F-9DB2-D39279B2A018}" type="slidenum">
+            <a:fld id="{F980F6E0-DADB-4D54-B4AA-A335EF19290B}" type="slidenum">
               <a:rPr lang="cs-CZ" smtClean="0"/>
               <a:t>‹#›</a:t>
             </a:fld>
@@ -247,7 +247,7 @@
     </p:spTree>
     <p:extLst>
       <p:ext uri="{BB962C8B-B14F-4D97-AF65-F5344CB8AC3E}">
-        <p14:creationId xmlns:p14="http://schemas.microsoft.com/office/powerpoint/2010/main" val="31897160"/>
+        <p14:creationId xmlns:p14="http://schemas.microsoft.com/office/powerpoint/2010/main" val="683755153"/>
       </p:ext>
     </p:extLst>
   </p:cSld>
@@ -284,7 +284,7 @@
           <p:cNvPr id="2" name="Title Placeholder 1">
             <a:extLst>
               <a:ext uri="{FF2B5EF4-FFF2-40B4-BE49-F238E27FC236}">
-                <a16:creationId xmlns:a16="http://schemas.microsoft.com/office/drawing/2014/main" id="{40A15B36-10B3-8FC1-5B34-32AC63540EB6}"/>
+                <a16:creationId xmlns:a16="http://schemas.microsoft.com/office/drawing/2014/main" id="{C150C23A-E7D4-C174-554F-2E08D02B0B15}"/>
               </a:ext>
             </a:extLst>
           </p:cNvPr>
@@ -323,7 +323,7 @@
           <p:cNvPr id="3" name="Text Placeholder 2">
             <a:extLst>
               <a:ext uri="{FF2B5EF4-FFF2-40B4-BE49-F238E27FC236}">
-                <a16:creationId xmlns:a16="http://schemas.microsoft.com/office/drawing/2014/main" id="{42A5FD5D-865F-79AB-2849-58795236C7D1}"/>
+                <a16:creationId xmlns:a16="http://schemas.microsoft.com/office/drawing/2014/main" id="{FE1F0BAB-8D34-E11D-F5F5-D6FFE5ECFA53}"/>
               </a:ext>
             </a:extLst>
           </p:cNvPr>
@@ -391,7 +391,7 @@
           <p:cNvPr id="4" name="Date Placeholder 3">
             <a:extLst>
               <a:ext uri="{FF2B5EF4-FFF2-40B4-BE49-F238E27FC236}">
-                <a16:creationId xmlns:a16="http://schemas.microsoft.com/office/drawing/2014/main" id="{21F996E8-792A-0B3A-9046-038D73EFBAB4}"/>
+                <a16:creationId xmlns:a16="http://schemas.microsoft.com/office/drawing/2014/main" id="{63401195-F25B-8E31-3683-9FA83BE189C8}"/>
               </a:ext>
             </a:extLst>
           </p:cNvPr>
@@ -425,9 +425,9 @@
             </a:lvl1pPr>
           </a:lstStyle>
           <a:p>
-            <a:fld id="{538F4ACB-81F4-4DFC-A610-803AC2463E56}" type="datetimeFigureOut">
+            <a:fld id="{0EB57F9A-D7FD-49DB-9770-949BA47D30B1}" type="datetimeFigureOut">
               <a:rPr lang="cs-CZ" smtClean="0"/>
-              <a:t>30.10.2022</a:t>
+              <a:t>31.10.2022</a:t>
             </a:fld>
             <a:endParaRPr lang="cs-CZ"/>
           </a:p>
@@ -438,7 +438,7 @@
           <p:cNvPr id="5" name="Footer Placeholder 4">
             <a:extLst>
               <a:ext uri="{FF2B5EF4-FFF2-40B4-BE49-F238E27FC236}">
-                <a16:creationId xmlns:a16="http://schemas.microsoft.com/office/drawing/2014/main" id="{D6187040-F780-F279-03E6-6750776617C8}"/>
+                <a16:creationId xmlns:a16="http://schemas.microsoft.com/office/drawing/2014/main" id="{55D64143-F2D3-75D9-8E3B-AB08773F908F}"/>
               </a:ext>
             </a:extLst>
           </p:cNvPr>
@@ -481,7 +481,7 @@
           <p:cNvPr id="6" name="Slide Number Placeholder 5">
             <a:extLst>
               <a:ext uri="{FF2B5EF4-FFF2-40B4-BE49-F238E27FC236}">
-                <a16:creationId xmlns:a16="http://schemas.microsoft.com/office/drawing/2014/main" id="{761506CF-BC16-08DE-E6DF-4A85C3D054C3}"/>
+                <a16:creationId xmlns:a16="http://schemas.microsoft.com/office/drawing/2014/main" id="{66BB87BF-A7F6-2EB8-E491-826B52C40F2B}"/>
               </a:ext>
             </a:extLst>
           </p:cNvPr>
@@ -515,7 +515,7 @@
             </a:lvl1pPr>
           </a:lstStyle>
           <a:p>
-            <a:fld id="{C53A4434-507F-402F-9DB2-D39279B2A018}" type="slidenum">
+            <a:fld id="{F980F6E0-DADB-4D54-B4AA-A335EF19290B}" type="slidenum">
               <a:rPr lang="cs-CZ" smtClean="0"/>
               <a:t>‹#›</a:t>
             </a:fld>
@@ -526,7 +526,7 @@
     </p:spTree>
     <p:extLst>
       <p:ext uri="{BB962C8B-B14F-4D97-AF65-F5344CB8AC3E}">
-        <p14:creationId xmlns:p14="http://schemas.microsoft.com/office/powerpoint/2010/main" val="1511133587"/>
+        <p14:creationId xmlns:p14="http://schemas.microsoft.com/office/powerpoint/2010/main" val="708666231"/>
       </p:ext>
     </p:extLst>
   </p:cSld>
@@ -845,7 +845,7 @@
           <p:cNvPr id="2" name="Title 1" hidden="1">
             <a:extLst>
               <a:ext uri="{FF2B5EF4-FFF2-40B4-BE49-F238E27FC236}">
-                <a16:creationId xmlns:a16="http://schemas.microsoft.com/office/drawing/2014/main" id="{2F248320-6F55-0FC8-57EE-E375D6019D3A}"/>
+                <a16:creationId xmlns:a16="http://schemas.microsoft.com/office/drawing/2014/main" id="{AB3F3C92-6BA2-80DC-D260-FB9B674615CB}"/>
               </a:ext>
             </a:extLst>
           </p:cNvPr>
@@ -879,7 +879,7 @@
           <p:cNvPr id="3" name="Picture 2">
             <a:extLst>
               <a:ext uri="{FF2B5EF4-FFF2-40B4-BE49-F238E27FC236}">
-                <a16:creationId xmlns:a16="http://schemas.microsoft.com/office/drawing/2014/main" id="{63051B3F-2888-3D4A-7E0E-6085DEB4F514}"/>
+                <a16:creationId xmlns:a16="http://schemas.microsoft.com/office/drawing/2014/main" id="{B9FB99DC-D0E5-99BE-179F-705DC77D0387}"/>
               </a:ext>
             </a:extLst>
           </p:cNvPr>
@@ -905,7 +905,7 @@
     </p:spTree>
     <p:extLst>
       <p:ext uri="{BB962C8B-B14F-4D97-AF65-F5344CB8AC3E}">
-        <p14:creationId xmlns:p14="http://schemas.microsoft.com/office/powerpoint/2010/main" val="1680453323"/>
+        <p14:creationId xmlns:p14="http://schemas.microsoft.com/office/powerpoint/2010/main" val="3399013695"/>
       </p:ext>
     </p:extLst>
   </p:cSld>
@@ -943,7 +943,7 @@
           <p:cNvPr id="2" name="Title 1" hidden="1">
             <a:extLst>
               <a:ext uri="{FF2B5EF4-FFF2-40B4-BE49-F238E27FC236}">
-                <a16:creationId xmlns:a16="http://schemas.microsoft.com/office/drawing/2014/main" id="{3CACA585-A6D3-B31A-7623-06E6B238996E}"/>
+                <a16:creationId xmlns:a16="http://schemas.microsoft.com/office/drawing/2014/main" id="{45F5F0C3-FC5F-4963-7C22-A1731348D78F}"/>
               </a:ext>
             </a:extLst>
           </p:cNvPr>
@@ -972,7 +972,7 @@
           <p:cNvPr id="3" name="Picture 2">
             <a:extLst>
               <a:ext uri="{FF2B5EF4-FFF2-40B4-BE49-F238E27FC236}">
-                <a16:creationId xmlns:a16="http://schemas.microsoft.com/office/drawing/2014/main" id="{5C57FA26-F484-8473-0855-346E8D22F445}"/>
+                <a16:creationId xmlns:a16="http://schemas.microsoft.com/office/drawing/2014/main" id="{85C91465-CC86-0570-764F-067AE225B0B2}"/>
               </a:ext>
             </a:extLst>
           </p:cNvPr>
@@ -998,7 +998,7 @@
     </p:spTree>
     <p:extLst>
       <p:ext uri="{BB962C8B-B14F-4D97-AF65-F5344CB8AC3E}">
-        <p14:creationId xmlns:p14="http://schemas.microsoft.com/office/powerpoint/2010/main" val="1834654647"/>
+        <p14:creationId xmlns:p14="http://schemas.microsoft.com/office/powerpoint/2010/main" val="2671623589"/>
       </p:ext>
     </p:extLst>
   </p:cSld>
@@ -1036,7 +1036,7 @@
           <p:cNvPr id="2" name="Title 1" hidden="1">
             <a:extLst>
               <a:ext uri="{FF2B5EF4-FFF2-40B4-BE49-F238E27FC236}">
-                <a16:creationId xmlns:a16="http://schemas.microsoft.com/office/drawing/2014/main" id="{701D08F4-19C9-3803-BDE4-749B96E9C956}"/>
+                <a16:creationId xmlns:a16="http://schemas.microsoft.com/office/drawing/2014/main" id="{7D9DCA7C-44E1-85B3-5D2E-211CD5862754}"/>
               </a:ext>
             </a:extLst>
           </p:cNvPr>
@@ -1065,7 +1065,7 @@
           <p:cNvPr id="3" name="Picture 2">
             <a:extLst>
               <a:ext uri="{FF2B5EF4-FFF2-40B4-BE49-F238E27FC236}">
-                <a16:creationId xmlns:a16="http://schemas.microsoft.com/office/drawing/2014/main" id="{30DC400F-059E-5717-2719-7C9331DBEEA8}"/>
+                <a16:creationId xmlns:a16="http://schemas.microsoft.com/office/drawing/2014/main" id="{C533DFFE-9430-9473-D6D8-B46C9C09D8F8}"/>
               </a:ext>
             </a:extLst>
           </p:cNvPr>
@@ -1091,7 +1091,7 @@
     </p:spTree>
     <p:extLst>
       <p:ext uri="{BB962C8B-B14F-4D97-AF65-F5344CB8AC3E}">
-        <p14:creationId xmlns:p14="http://schemas.microsoft.com/office/powerpoint/2010/main" val="515052348"/>
+        <p14:creationId xmlns:p14="http://schemas.microsoft.com/office/powerpoint/2010/main" val="2262348974"/>
       </p:ext>
     </p:extLst>
   </p:cSld>
@@ -1129,7 +1129,7 @@
           <p:cNvPr id="2" name="Title 1" hidden="1">
             <a:extLst>
               <a:ext uri="{FF2B5EF4-FFF2-40B4-BE49-F238E27FC236}">
-                <a16:creationId xmlns:a16="http://schemas.microsoft.com/office/drawing/2014/main" id="{5681CEDC-03C9-1972-9167-4C1C55964A9E}"/>
+                <a16:creationId xmlns:a16="http://schemas.microsoft.com/office/drawing/2014/main" id="{B1FB25E4-7C4C-2D2A-DEBD-52E1C35E4C75}"/>
               </a:ext>
             </a:extLst>
           </p:cNvPr>
@@ -1158,7 +1158,7 @@
           <p:cNvPr id="3" name="Picture 2">
             <a:extLst>
               <a:ext uri="{FF2B5EF4-FFF2-40B4-BE49-F238E27FC236}">
-                <a16:creationId xmlns:a16="http://schemas.microsoft.com/office/drawing/2014/main" id="{12D3224C-DDFF-5C37-4D30-65DA99D6E232}"/>
+                <a16:creationId xmlns:a16="http://schemas.microsoft.com/office/drawing/2014/main" id="{D75C6F55-62FE-E0CC-AA90-9422E93F059C}"/>
               </a:ext>
             </a:extLst>
           </p:cNvPr>
@@ -1184,7 +1184,7 @@
     </p:spTree>
     <p:extLst>
       <p:ext uri="{BB962C8B-B14F-4D97-AF65-F5344CB8AC3E}">
-        <p14:creationId xmlns:p14="http://schemas.microsoft.com/office/powerpoint/2010/main" val="3701366172"/>
+        <p14:creationId xmlns:p14="http://schemas.microsoft.com/office/powerpoint/2010/main" val="1136917449"/>
       </p:ext>
     </p:extLst>
   </p:cSld>
@@ -1222,7 +1222,7 @@
           <p:cNvPr id="2" name="Title 1" hidden="1">
             <a:extLst>
               <a:ext uri="{FF2B5EF4-FFF2-40B4-BE49-F238E27FC236}">
-                <a16:creationId xmlns:a16="http://schemas.microsoft.com/office/drawing/2014/main" id="{F4B73318-24D1-7795-804B-8C7E517530CF}"/>
+                <a16:creationId xmlns:a16="http://schemas.microsoft.com/office/drawing/2014/main" id="{E1FF961F-96D8-D32E-38B4-1B2E5413261C}"/>
               </a:ext>
             </a:extLst>
           </p:cNvPr>
@@ -1251,7 +1251,7 @@
           <p:cNvPr id="3" name="Picture 2">
             <a:extLst>
               <a:ext uri="{FF2B5EF4-FFF2-40B4-BE49-F238E27FC236}">
-                <a16:creationId xmlns:a16="http://schemas.microsoft.com/office/drawing/2014/main" id="{477A2839-124C-0612-9F6A-E1CB9A8EAC49}"/>
+                <a16:creationId xmlns:a16="http://schemas.microsoft.com/office/drawing/2014/main" id="{C8F96954-65AE-4CB2-B494-0A224A308793}"/>
               </a:ext>
             </a:extLst>
           </p:cNvPr>
@@ -1277,7 +1277,7 @@
     </p:spTree>
     <p:extLst>
       <p:ext uri="{BB962C8B-B14F-4D97-AF65-F5344CB8AC3E}">
-        <p14:creationId xmlns:p14="http://schemas.microsoft.com/office/powerpoint/2010/main" val="2897130965"/>
+        <p14:creationId xmlns:p14="http://schemas.microsoft.com/office/powerpoint/2010/main" val="1933315637"/>
       </p:ext>
     </p:extLst>
   </p:cSld>
@@ -1315,7 +1315,7 @@
           <p:cNvPr id="2" name="Title 1" hidden="1">
             <a:extLst>
               <a:ext uri="{FF2B5EF4-FFF2-40B4-BE49-F238E27FC236}">
-                <a16:creationId xmlns:a16="http://schemas.microsoft.com/office/drawing/2014/main" id="{30ABB609-3F5B-A340-9CFF-6424D324FF99}"/>
+                <a16:creationId xmlns:a16="http://schemas.microsoft.com/office/drawing/2014/main" id="{3D2AB043-1B92-D004-15D3-218ACC2A8A2D}"/>
               </a:ext>
             </a:extLst>
           </p:cNvPr>
@@ -1344,7 +1344,7 @@
           <p:cNvPr id="3" name="Picture 2">
             <a:extLst>
               <a:ext uri="{FF2B5EF4-FFF2-40B4-BE49-F238E27FC236}">
-                <a16:creationId xmlns:a16="http://schemas.microsoft.com/office/drawing/2014/main" id="{C494FA52-8887-9678-07A3-3BECC64004CC}"/>
+                <a16:creationId xmlns:a16="http://schemas.microsoft.com/office/drawing/2014/main" id="{39699E46-A391-D985-F2D0-BF51AE05111B}"/>
               </a:ext>
             </a:extLst>
           </p:cNvPr>
@@ -1370,7 +1370,7 @@
     </p:spTree>
     <p:extLst>
       <p:ext uri="{BB962C8B-B14F-4D97-AF65-F5344CB8AC3E}">
-        <p14:creationId xmlns:p14="http://schemas.microsoft.com/office/powerpoint/2010/main" val="2121321224"/>
+        <p14:creationId xmlns:p14="http://schemas.microsoft.com/office/powerpoint/2010/main" val="97154877"/>
       </p:ext>
     </p:extLst>
   </p:cSld>
@@ -1408,7 +1408,7 @@
           <p:cNvPr id="2" name="Title 1" hidden="1">
             <a:extLst>
               <a:ext uri="{FF2B5EF4-FFF2-40B4-BE49-F238E27FC236}">
-                <a16:creationId xmlns:a16="http://schemas.microsoft.com/office/drawing/2014/main" id="{80F8B27B-263F-F096-D910-86F993F0C962}"/>
+                <a16:creationId xmlns:a16="http://schemas.microsoft.com/office/drawing/2014/main" id="{8C939D25-5972-C46F-8E9D-F97F21C6AE0F}"/>
               </a:ext>
             </a:extLst>
           </p:cNvPr>
@@ -1437,7 +1437,7 @@
           <p:cNvPr id="3" name="Picture 2">
             <a:extLst>
               <a:ext uri="{FF2B5EF4-FFF2-40B4-BE49-F238E27FC236}">
-                <a16:creationId xmlns:a16="http://schemas.microsoft.com/office/drawing/2014/main" id="{C8784354-A814-3C81-2839-E540DDCAF360}"/>
+                <a16:creationId xmlns:a16="http://schemas.microsoft.com/office/drawing/2014/main" id="{17E4A0E7-0F9E-EDD3-19BD-A2766442ECAF}"/>
               </a:ext>
             </a:extLst>
           </p:cNvPr>
@@ -1463,7 +1463,7 @@
     </p:spTree>
     <p:extLst>
       <p:ext uri="{BB962C8B-B14F-4D97-AF65-F5344CB8AC3E}">
-        <p14:creationId xmlns:p14="http://schemas.microsoft.com/office/powerpoint/2010/main" val="1635434409"/>
+        <p14:creationId xmlns:p14="http://schemas.microsoft.com/office/powerpoint/2010/main" val="2009904274"/>
       </p:ext>
     </p:extLst>
   </p:cSld>
@@ -1501,7 +1501,7 @@
           <p:cNvPr id="2" name="Title 1" hidden="1">
             <a:extLst>
               <a:ext uri="{FF2B5EF4-FFF2-40B4-BE49-F238E27FC236}">
-                <a16:creationId xmlns:a16="http://schemas.microsoft.com/office/drawing/2014/main" id="{7990B82D-EF00-7129-08D3-88A782C67F5F}"/>
+                <a16:creationId xmlns:a16="http://schemas.microsoft.com/office/drawing/2014/main" id="{D118CB91-280A-8FBD-55F7-4C26B982BF39}"/>
               </a:ext>
             </a:extLst>
           </p:cNvPr>
@@ -1530,7 +1530,7 @@
           <p:cNvPr id="3" name="Picture 2">
             <a:extLst>
               <a:ext uri="{FF2B5EF4-FFF2-40B4-BE49-F238E27FC236}">
-                <a16:creationId xmlns:a16="http://schemas.microsoft.com/office/drawing/2014/main" id="{9C76E31A-F4E0-43E7-7186-B8D291A654EC}"/>
+                <a16:creationId xmlns:a16="http://schemas.microsoft.com/office/drawing/2014/main" id="{DF8914EB-019D-3FFF-49CE-EF008055B086}"/>
               </a:ext>
             </a:extLst>
           </p:cNvPr>
@@ -1556,7 +1556,7 @@
     </p:spTree>
     <p:extLst>
       <p:ext uri="{BB962C8B-B14F-4D97-AF65-F5344CB8AC3E}">
-        <p14:creationId xmlns:p14="http://schemas.microsoft.com/office/powerpoint/2010/main" val="2336451012"/>
+        <p14:creationId xmlns:p14="http://schemas.microsoft.com/office/powerpoint/2010/main" val="1880713477"/>
       </p:ext>
     </p:extLst>
   </p:cSld>
@@ -1594,7 +1594,7 @@
           <p:cNvPr id="2" name="Title 1" hidden="1">
             <a:extLst>
               <a:ext uri="{FF2B5EF4-FFF2-40B4-BE49-F238E27FC236}">
-                <a16:creationId xmlns:a16="http://schemas.microsoft.com/office/drawing/2014/main" id="{1110A9FC-8B1C-6176-127C-C04F5B453C04}"/>
+                <a16:creationId xmlns:a16="http://schemas.microsoft.com/office/drawing/2014/main" id="{9961E6FA-A2FC-EB03-5C25-D185D4B76975}"/>
               </a:ext>
             </a:extLst>
           </p:cNvPr>
@@ -1623,7 +1623,7 @@
           <p:cNvPr id="3" name="Picture 2">
             <a:extLst>
               <a:ext uri="{FF2B5EF4-FFF2-40B4-BE49-F238E27FC236}">
-                <a16:creationId xmlns:a16="http://schemas.microsoft.com/office/drawing/2014/main" id="{60D5AC48-EF2E-33E9-AACD-977CB51DC3C6}"/>
+                <a16:creationId xmlns:a16="http://schemas.microsoft.com/office/drawing/2014/main" id="{67D68B42-5EED-997A-0624-1C8AC1FE150E}"/>
               </a:ext>
             </a:extLst>
           </p:cNvPr>
@@ -1649,7 +1649,7 @@
     </p:spTree>
     <p:extLst>
       <p:ext uri="{BB962C8B-B14F-4D97-AF65-F5344CB8AC3E}">
-        <p14:creationId xmlns:p14="http://schemas.microsoft.com/office/powerpoint/2010/main" val="2942031274"/>
+        <p14:creationId xmlns:p14="http://schemas.microsoft.com/office/powerpoint/2010/main" val="3634325661"/>
       </p:ext>
     </p:extLst>
   </p:cSld>

</xml_diff>